<commit_message>
Module 09 release candidate 1
</commit_message>
<xml_diff>
--- a/Slides/Module 09 React Hooks.pptx
+++ b/Slides/Module 09 React Hooks.pptx
@@ -2518,26 +2518,14 @@
           <a:p>
             <a:r>
               <a:rPr lang="en-US" dirty="0"/>
-              <a:t>Welcome to Module 09: React Hooks.   Hooks are a unique feature of REACT, which enable React components to deal with inputs other than mouse clicks and the like.  </a:t>
+              <a:t>Welcome to Module09: React Hooks.   Hooks are a unique feature of REACT, which enable React components to deal with inputs other than mouse clicks and the like.  </a:t>
             </a:r>
           </a:p>
           <a:p>
             <a:endParaRPr lang="en-US" dirty="0"/>
           </a:p>
           <a:p>
-            <a:r>
-              <a:rPr lang="en-US" dirty="0"/>
-              <a:t>In Module 08, we talked about hooks.</a:t>
-            </a:r>
-          </a:p>
-          <a:p>
             <a:endParaRPr lang="en-US" dirty="0"/>
-          </a:p>
-          <a:p>
-            <a:r>
-              <a:rPr lang="en-US" dirty="0"/>
-              <a:t>In this module, We'll talk briefly about how to do automated testing of React applications.</a:t>
-            </a:r>
           </a:p>
         </p:txBody>
       </p:sp>
@@ -3729,7 +3717,36 @@
             </a:r>
             <a:r>
               <a:rPr lang="en-US" dirty="0"/>
-              <a:t> later on.</a:t>
+              <a:t>, (or start and stop the clock, if that affordance is available) from the client.   </a:t>
+            </a:r>
+          </a:p>
+          <a:p>
+            <a:endParaRPr lang="en-US" dirty="0"/>
+          </a:p>
+          <a:p>
+            <a:r>
+              <a:rPr lang="en-US" dirty="0"/>
+              <a:t>/** this para only applies if we get starting and stopping working </a:t>
+            </a:r>
+          </a:p>
+          <a:p>
+            <a:r>
+              <a:rPr lang="en-US" dirty="0"/>
+              <a:t>Note that if we have several components (as in </a:t>
+            </a:r>
+            <a:r>
+              <a:rPr lang="en-US" dirty="0" err="1"/>
+              <a:t>ArrayOfClocksApp</a:t>
+            </a:r>
+            <a:r>
+              <a:rPr lang="en-US" dirty="0"/>
+              <a:t>), stopping or starting the clock in one component will start or stop it in all of them.</a:t>
+            </a:r>
+          </a:p>
+          <a:p>
+            <a:r>
+              <a:rPr lang="en-US" dirty="0"/>
+              <a:t>*/</a:t>
             </a:r>
           </a:p>
           <a:p>
@@ -3746,7 +3763,7 @@
             </a:r>
             <a:r>
               <a:rPr lang="en-US" dirty="0"/>
-              <a:t> makes extensive use a hook called </a:t>
+              <a:t> makes extensive use of a hook called </a:t>
             </a:r>
             <a:r>
               <a:rPr lang="en-US" dirty="0" err="1"/>
@@ -3985,16 +4002,15 @@
           <a:p>
             <a:r>
               <a:rPr lang="en-US" dirty="0"/>
-              <a:t>Welcome to Part 2 of Module 8.  In this video, we'll briefly discuss how we might go about testing React components.</a:t>
-            </a:r>
-          </a:p>
-          <a:p>
-            <a:endParaRPr lang="en-US" dirty="0"/>
-          </a:p>
-          <a:p>
+              <a:t>We can test React components by building a test double for the react system. The test double render </a:t>
+            </a:r>
+            <a:r>
+              <a:rPr lang="en-US" dirty="0" err="1"/>
+              <a:t>scomponents</a:t>
+            </a:r>
             <a:r>
               <a:rPr lang="en-US" dirty="0"/>
-              <a:t>What we'd like to do is to build a "fake React".  The fake would render components into a "virtual </a:t>
+              <a:t> into a "virtual </a:t>
             </a:r>
             <a:r>
               <a:rPr lang="en-US" dirty="0" err="1"/>
@@ -4002,15 +4018,7 @@
             </a:r>
             <a:r>
               <a:rPr lang="en-US" dirty="0"/>
-              <a:t>" just like the browser's DOM.  We would interact with the fake </a:t>
-            </a:r>
-            <a:r>
-              <a:rPr lang="en-US" dirty="0" err="1"/>
-              <a:t>dom</a:t>
-            </a:r>
-            <a:r>
-              <a:rPr lang="en-US" dirty="0"/>
-              <a:t> by firing events just like a user would, and then we should be able to inspect the virtual DOM to see what happened.</a:t>
+              <a:t>" just like the browser's DOM.  We can interact with the test by firing events just like a user would, and then we should be able to inspect the virtual DOM to see what happened.</a:t>
             </a:r>
           </a:p>
           <a:p>
@@ -4436,7 +4444,15 @@
           <a:p>
             <a:r>
               <a:rPr lang="en-US" dirty="0"/>
-              <a:t>We'll need to fake-interact with our fake-dom.  The library provides a set of methods for doing this.</a:t>
+              <a:t>We'll need to </a:t>
+            </a:r>
+            <a:r>
+              <a:rPr lang="en-US" dirty="0" err="1"/>
+              <a:t>nteract</a:t>
+            </a:r>
+            <a:r>
+              <a:rPr lang="en-US" dirty="0"/>
+              <a:t> with our fake-dom.  The library provides a set of methods for doing this.</a:t>
             </a:r>
           </a:p>
           <a:p>
@@ -5012,7 +5028,7 @@
             </a:r>
             <a:r>
               <a:rPr lang="en-US" i="0" dirty="0"/>
-              <a:t> design, this is value returned by the hook function-- look at the 'return'.  Because this hook is run only when the component mounts, the cleanup function is run only when the component dismounts.  In this case, the cleanup function releases the connection to the external clock.  This is the polite thing to do, as it eliminates possible resource leaks. We'll talk about other possibilities later. </a:t>
+              <a:t> design, this is the value returned by the hook function-- look at the 'return'.  Because this hook is run only when the component mounts, the cleanup function is run only when the component dismounts.  In this case, the cleanup function releases the connection to the external clock.  This is the polite thing to do, as it eliminates possible resource leaks. We'll talk about other possibilities later. </a:t>
             </a:r>
           </a:p>
           <a:p>
@@ -5246,7 +5262,7 @@
           <a:p>
             <a:r>
               <a:rPr lang="en-US" dirty="0"/>
-              <a:t>What do we mean by an "external system" &lt;read slide&gt;</a:t>
+              <a:t>What do we mean by an "external system"? &lt;read slide&gt;</a:t>
             </a:r>
           </a:p>
         </p:txBody>
@@ -5563,7 +5579,7 @@
           <a:p>
             <a:r>
               <a:rPr lang="en-US" dirty="0"/>
-              <a:t>We'll make the clock into a singleton, just like we did back in Module 04.</a:t>
+              <a:t>We'll make the clock into a singleton, just like we did back in Module 05.</a:t>
             </a:r>
           </a:p>
         </p:txBody>
@@ -5688,6 +5704,20 @@
               <a:rPr lang="en-US" dirty="0"/>
               <a:t>Let’s watch it in action again. &lt;Demo, again&gt;</a:t>
             </a:r>
+          </a:p>
+          <a:p>
+            <a:endParaRPr lang="en-US" dirty="0"/>
+          </a:p>
+          <a:p>
+            <a:r>
+              <a:rPr lang="en-US" dirty="0"/>
+              <a:t>&lt;Demo in 2 windows, demonstrating that the code is running *in the </a:t>
+            </a:r>
+            <a:r>
+              <a:rPr lang="en-US"/>
+              <a:t>browser window*</a:t>
+            </a:r>
+            <a:endParaRPr lang="en-US" dirty="0"/>
           </a:p>
           <a:p>
             <a:endParaRPr lang="en-US" dirty="0"/>
@@ -8258,7 +8288,15 @@
             </a:pPr>
             <a:r>
               <a:rPr lang="en-US" sz="2800" dirty="0"/>
-              <a:t>Jon Bell, Adeel Bhutta and Mitch Wand</a:t>
+              <a:t>Jon Bell, Adeel </a:t>
+            </a:r>
+            <a:r>
+              <a:rPr lang="en-US" sz="2800" dirty="0" err="1"/>
+              <a:t>Bhutta</a:t>
+            </a:r>
+            <a:r>
+              <a:rPr lang="en-US" sz="2800" dirty="0"/>
+              <a:t> and Mitch Wand</a:t>
             </a:r>
           </a:p>
           <a:p>
@@ -8355,7 +8393,7 @@
             </a:r>
             <a:r>
               <a:rPr lang="en-US" dirty="0"/>
-              <a:t>4</a:t>
+              <a:t>3-24</a:t>
             </a:r>
             <a:r>
               <a:rPr dirty="0"/>
@@ -11083,12 +11121,20 @@
           <a:p>
             <a:pPr algn="ctr"/>
             <a:r>
+              <a:rPr lang="en-US" sz="2400" dirty="0" err="1">
+                <a:solidFill>
+                  <a:schemeClr val="tx1"/>
+                </a:solidFill>
+              </a:rPr>
+              <a:t>src</a:t>
+            </a:r>
+            <a:r>
               <a:rPr lang="en-US" sz="2400" dirty="0">
                 <a:solidFill>
                   <a:schemeClr val="tx1"/>
                 </a:solidFill>
               </a:rPr>
-              <a:t>app/Apps/</a:t>
+              <a:t>/app/Apps/</a:t>
             </a:r>
             <a:r>
               <a:rPr lang="en-US" sz="2400" dirty="0" err="1">
@@ -12914,12 +12960,20 @@
           <a:p>
             <a:pPr algn="ctr"/>
             <a:r>
+              <a:rPr lang="en-US" sz="2400" dirty="0" err="1">
+                <a:solidFill>
+                  <a:schemeClr val="tx1"/>
+                </a:solidFill>
+              </a:rPr>
+              <a:t>src</a:t>
+            </a:r>
+            <a:r>
               <a:rPr lang="en-US" sz="2400" dirty="0">
                 <a:solidFill>
                   <a:schemeClr val="tx1"/>
                 </a:solidFill>
               </a:rPr>
-              <a:t>app/Apps/</a:t>
+              <a:t>/app/Apps/</a:t>
             </a:r>
             <a:r>
               <a:rPr lang="en-US" sz="2400" dirty="0" err="1">
@@ -16140,12 +16194,20 @@
           <a:p>
             <a:pPr algn="ctr"/>
             <a:r>
+              <a:rPr lang="en-US" sz="2400" dirty="0" err="1">
+                <a:solidFill>
+                  <a:schemeClr val="tx1"/>
+                </a:solidFill>
+              </a:rPr>
+              <a:t>src</a:t>
+            </a:r>
+            <a:r>
               <a:rPr lang="en-US" sz="2400" dirty="0">
                 <a:solidFill>
                   <a:schemeClr val="tx1"/>
                 </a:solidFill>
               </a:rPr>
-              <a:t>app/Apps/</a:t>
+              <a:t>/app/Apps/</a:t>
             </a:r>
             <a:r>
               <a:rPr lang="en-US" sz="2400" dirty="0" err="1">
@@ -16905,7 +16967,7 @@
         </p:nvSpPr>
         <p:spPr>
           <a:xfrm>
-            <a:off x="2547257" y="4618038"/>
+            <a:off x="838200" y="4389300"/>
             <a:ext cx="9143999" cy="1754326"/>
           </a:xfrm>
           <a:prstGeom prst="rect">
@@ -17258,7 +17320,7 @@
         </p:nvSpPr>
         <p:spPr>
           <a:xfrm>
-            <a:off x="8046719" y="2239962"/>
+            <a:off x="9278785" y="2248528"/>
             <a:ext cx="1745027" cy="584773"/>
           </a:xfrm>
           <a:prstGeom prst="rect">
@@ -17340,7 +17402,7 @@
         </p:nvSpPr>
         <p:spPr>
           <a:xfrm>
-            <a:off x="1406433" y="5031059"/>
+            <a:off x="9791746" y="4796806"/>
             <a:ext cx="719106" cy="584773"/>
           </a:xfrm>
           <a:prstGeom prst="rect">
@@ -17462,12 +17524,20 @@
           <a:p>
             <a:pPr algn="ctr"/>
             <a:r>
+              <a:rPr lang="en-US" sz="2400" dirty="0" err="1">
+                <a:solidFill>
+                  <a:schemeClr val="tx1"/>
+                </a:solidFill>
+              </a:rPr>
+              <a:t>src</a:t>
+            </a:r>
+            <a:r>
               <a:rPr lang="en-US" sz="2400" dirty="0">
                 <a:solidFill>
                   <a:schemeClr val="tx1"/>
                 </a:solidFill>
               </a:rPr>
-              <a:t>app/Hooks/</a:t>
+              <a:t>/app/Hooks/</a:t>
             </a:r>
             <a:r>
               <a:rPr lang="en-US" sz="2400" dirty="0" err="1">
@@ -18535,12 +18605,20 @@
           <a:p>
             <a:pPr algn="ctr"/>
             <a:r>
+              <a:rPr lang="en-US" sz="2400" dirty="0" err="1">
+                <a:solidFill>
+                  <a:schemeClr val="tx1"/>
+                </a:solidFill>
+              </a:rPr>
+              <a:t>src</a:t>
+            </a:r>
+            <a:r>
               <a:rPr lang="en-US" sz="2400" dirty="0">
                 <a:solidFill>
                   <a:schemeClr val="tx1"/>
                 </a:solidFill>
               </a:rPr>
-              <a:t>app/Hooks/</a:t>
+              <a:t>/app/Hooks/</a:t>
             </a:r>
             <a:r>
               <a:rPr lang="en-US" sz="2400" dirty="0" err="1">
@@ -26897,6 +26975,12 @@
           <a:p>
             <a:r>
               <a:rPr lang="en-US" dirty="0"/>
+              <a:t>A call to fetch data from an external web site</a:t>
+            </a:r>
+          </a:p>
+          <a:p>
+            <a:r>
+              <a:rPr lang="en-US" dirty="0"/>
               <a:t>An external animation library</a:t>
             </a:r>
           </a:p>
@@ -27357,7 +27441,20 @@
                 <a:effectLst/>
                 <a:latin typeface="Consolas" panose="020B0609020204030204" pitchFamily="49" charset="0"/>
               </a:rPr>
-              <a:t> = () </a:t>
+              <a:t> = </a:t>
+            </a:r>
+            <a:r>
+              <a:rPr lang="en-US" b="0" dirty="0">
+                <a:solidFill>
+                  <a:srgbClr val="000000"/>
+                </a:solidFill>
+                <a:effectLst/>
+                <a:highlight>
+                  <a:srgbClr val="FFFF00"/>
+                </a:highlight>
+                <a:latin typeface="Consolas" panose="020B0609020204030204" pitchFamily="49" charset="0"/>
+              </a:rPr>
+              <a:t>() </a:t>
             </a:r>
             <a:r>
               <a:rPr lang="en-US" b="0" dirty="0">
@@ -27365,6 +27462,9 @@
                   <a:srgbClr val="0000FF"/>
                 </a:solidFill>
                 <a:effectLst/>
+                <a:highlight>
+                  <a:srgbClr val="FFFF00"/>
+                </a:highlight>
                 <a:latin typeface="Consolas" panose="020B0609020204030204" pitchFamily="49" charset="0"/>
               </a:rPr>
               <a:t>=&gt;</a:t>
@@ -27375,6 +27475,9 @@
                   <a:srgbClr val="000000"/>
                 </a:solidFill>
                 <a:effectLst/>
+                <a:highlight>
+                  <a:srgbClr val="FFFF00"/>
+                </a:highlight>
                 <a:latin typeface="Consolas" panose="020B0609020204030204" pitchFamily="49" charset="0"/>
               </a:rPr>
               <a:t> </a:t>
@@ -27385,6 +27488,9 @@
                   <a:srgbClr val="795E26"/>
                 </a:solidFill>
                 <a:effectLst/>
+                <a:highlight>
+                  <a:srgbClr val="FFFF00"/>
+                </a:highlight>
                 <a:latin typeface="Consolas" panose="020B0609020204030204" pitchFamily="49" charset="0"/>
               </a:rPr>
               <a:t>setLocalTime</a:t>
@@ -27395,6 +27501,9 @@
                   <a:srgbClr val="000000"/>
                 </a:solidFill>
                 <a:effectLst/>
+                <a:highlight>
+                  <a:srgbClr val="FFFF00"/>
+                </a:highlight>
                 <a:latin typeface="Consolas" panose="020B0609020204030204" pitchFamily="49" charset="0"/>
               </a:rPr>
               <a:t>(</a:t>
@@ -27405,6 +27514,9 @@
                   <a:srgbClr val="001080"/>
                 </a:solidFill>
                 <a:effectLst/>
+                <a:highlight>
+                  <a:srgbClr val="FFFF00"/>
+                </a:highlight>
                 <a:latin typeface="Consolas" panose="020B0609020204030204" pitchFamily="49" charset="0"/>
               </a:rPr>
               <a:t>localTime</a:t>
@@ -27415,6 +27527,9 @@
                   <a:srgbClr val="000000"/>
                 </a:solidFill>
                 <a:effectLst/>
+                <a:highlight>
+                  <a:srgbClr val="FFFF00"/>
+                </a:highlight>
                 <a:latin typeface="Consolas" panose="020B0609020204030204" pitchFamily="49" charset="0"/>
               </a:rPr>
               <a:t> </a:t>
@@ -27425,6 +27540,9 @@
                   <a:srgbClr val="0000FF"/>
                 </a:solidFill>
                 <a:effectLst/>
+                <a:highlight>
+                  <a:srgbClr val="FFFF00"/>
+                </a:highlight>
                 <a:latin typeface="Consolas" panose="020B0609020204030204" pitchFamily="49" charset="0"/>
               </a:rPr>
               <a:t>=&gt;</a:t>
@@ -27435,6 +27553,9 @@
                   <a:srgbClr val="000000"/>
                 </a:solidFill>
                 <a:effectLst/>
+                <a:highlight>
+                  <a:srgbClr val="FFFF00"/>
+                </a:highlight>
                 <a:latin typeface="Consolas" panose="020B0609020204030204" pitchFamily="49" charset="0"/>
               </a:rPr>
               <a:t> </a:t>
@@ -27445,6 +27566,9 @@
                   <a:srgbClr val="001080"/>
                 </a:solidFill>
                 <a:effectLst/>
+                <a:highlight>
+                  <a:srgbClr val="FFFF00"/>
+                </a:highlight>
                 <a:latin typeface="Consolas" panose="020B0609020204030204" pitchFamily="49" charset="0"/>
               </a:rPr>
               <a:t>localTime</a:t>
@@ -27455,6 +27579,9 @@
                   <a:srgbClr val="000000"/>
                 </a:solidFill>
                 <a:effectLst/>
+                <a:highlight>
+                  <a:srgbClr val="FFFF00"/>
+                </a:highlight>
                 <a:latin typeface="Consolas" panose="020B0609020204030204" pitchFamily="49" charset="0"/>
               </a:rPr>
               <a:t> + </a:t>
@@ -27465,6 +27592,9 @@
                   <a:srgbClr val="098658"/>
                 </a:solidFill>
                 <a:effectLst/>
+                <a:highlight>
+                  <a:srgbClr val="FFFF00"/>
+                </a:highlight>
                 <a:latin typeface="Consolas" panose="020B0609020204030204" pitchFamily="49" charset="0"/>
               </a:rPr>
               <a:t>1</a:t>
@@ -27475,6 +27605,9 @@
                   <a:srgbClr val="000000"/>
                 </a:solidFill>
                 <a:effectLst/>
+                <a:highlight>
+                  <a:srgbClr val="FFFF00"/>
+                </a:highlight>
                 <a:latin typeface="Consolas" panose="020B0609020204030204" pitchFamily="49" charset="0"/>
               </a:rPr>
               <a:t>)</a:t>
@@ -27519,7 +27652,20 @@
                 <a:effectLst/>
                 <a:latin typeface="Consolas" panose="020B0609020204030204" pitchFamily="49" charset="0"/>
               </a:rPr>
-              <a:t> = () </a:t>
+              <a:t> = </a:t>
+            </a:r>
+            <a:r>
+              <a:rPr lang="en-US" b="0" dirty="0">
+                <a:solidFill>
+                  <a:srgbClr val="000000"/>
+                </a:solidFill>
+                <a:effectLst/>
+                <a:highlight>
+                  <a:srgbClr val="FFFF00"/>
+                </a:highlight>
+                <a:latin typeface="Consolas" panose="020B0609020204030204" pitchFamily="49" charset="0"/>
+              </a:rPr>
+              <a:t>() </a:t>
             </a:r>
             <a:r>
               <a:rPr lang="en-US" b="0" dirty="0">
@@ -27527,6 +27673,9 @@
                   <a:srgbClr val="0000FF"/>
                 </a:solidFill>
                 <a:effectLst/>
+                <a:highlight>
+                  <a:srgbClr val="FFFF00"/>
+                </a:highlight>
                 <a:latin typeface="Consolas" panose="020B0609020204030204" pitchFamily="49" charset="0"/>
               </a:rPr>
               <a:t>=&gt;</a:t>
@@ -27537,6 +27686,9 @@
                   <a:srgbClr val="000000"/>
                 </a:solidFill>
                 <a:effectLst/>
+                <a:highlight>
+                  <a:srgbClr val="FFFF00"/>
+                </a:highlight>
                 <a:latin typeface="Consolas" panose="020B0609020204030204" pitchFamily="49" charset="0"/>
               </a:rPr>
               <a:t> { </a:t>
@@ -27547,6 +27699,9 @@
                   <a:srgbClr val="795E26"/>
                 </a:solidFill>
                 <a:effectLst/>
+                <a:highlight>
+                  <a:srgbClr val="FFFF00"/>
+                </a:highlight>
                 <a:latin typeface="Consolas" panose="020B0609020204030204" pitchFamily="49" charset="0"/>
               </a:rPr>
               <a:t>incrementLocalTime</a:t>
@@ -27557,6 +27712,9 @@
                   <a:srgbClr val="000000"/>
                 </a:solidFill>
                 <a:effectLst/>
+                <a:highlight>
+                  <a:srgbClr val="FFFF00"/>
+                </a:highlight>
                 <a:latin typeface="Consolas" panose="020B0609020204030204" pitchFamily="49" charset="0"/>
               </a:rPr>
               <a:t>() }</a:t>
@@ -27802,6 +27960,9 @@
                   <a:srgbClr val="795E26"/>
                 </a:solidFill>
                 <a:effectLst/>
+                <a:highlight>
+                  <a:srgbClr val="FFFF00"/>
+                </a:highlight>
                 <a:latin typeface="Consolas" panose="020B0609020204030204" pitchFamily="49" charset="0"/>
               </a:rPr>
               <a:t>listener1</a:t>
@@ -27926,9 +28087,22 @@
                   <a:srgbClr val="795E26"/>
                 </a:solidFill>
                 <a:effectLst/>
-                <a:latin typeface="Consolas" panose="020B0609020204030204" pitchFamily="49" charset="0"/>
-              </a:rPr>
-              <a:t>listener1</a:t>
+                <a:highlight>
+                  <a:srgbClr val="FFFF00"/>
+                </a:highlight>
+                <a:latin typeface="Consolas" panose="020B0609020204030204" pitchFamily="49" charset="0"/>
+              </a:rPr>
+              <a:t>listener</a:t>
+            </a:r>
+            <a:r>
+              <a:rPr lang="en-US" b="0" dirty="0">
+                <a:solidFill>
+                  <a:srgbClr val="795E26"/>
+                </a:solidFill>
+                <a:effectLst/>
+                <a:latin typeface="Consolas" panose="020B0609020204030204" pitchFamily="49" charset="0"/>
+              </a:rPr>
+              <a:t>1</a:t>
             </a:r>
             <a:r>
               <a:rPr lang="en-US" b="0" dirty="0">
@@ -28442,7 +28616,7 @@
         <p:spPr>
           <a:xfrm>
             <a:off x="838200" y="1618103"/>
-            <a:ext cx="10967113" cy="3416320"/>
+            <a:ext cx="11353800" cy="4247317"/>
           </a:xfrm>
           <a:prstGeom prst="rect">
             <a:avLst/>
@@ -28831,6 +29005,56 @@
                 <a:effectLst/>
                 <a:latin typeface="Consolas" panose="020B0609020204030204" pitchFamily="49" charset="0"/>
               </a:rPr>
+              <a:t>key</a:t>
+            </a:r>
+            <a:r>
+              <a:rPr lang="en-US" b="0" dirty="0">
+                <a:solidFill>
+                  <a:srgbClr val="000000"/>
+                </a:solidFill>
+                <a:effectLst/>
+                <a:latin typeface="Consolas" panose="020B0609020204030204" pitchFamily="49" charset="0"/>
+              </a:rPr>
+              <a:t>=</a:t>
+            </a:r>
+            <a:r>
+              <a:rPr lang="en-US" b="0" dirty="0">
+                <a:solidFill>
+                  <a:srgbClr val="0000FF"/>
+                </a:solidFill>
+                <a:effectLst/>
+                <a:latin typeface="Consolas" panose="020B0609020204030204" pitchFamily="49" charset="0"/>
+              </a:rPr>
+              <a:t>{</a:t>
+            </a:r>
+            <a:r>
+              <a:rPr lang="en-US" b="0" dirty="0">
+                <a:solidFill>
+                  <a:srgbClr val="098658"/>
+                </a:solidFill>
+                <a:effectLst/>
+                <a:latin typeface="Consolas" panose="020B0609020204030204" pitchFamily="49" charset="0"/>
+              </a:rPr>
+              <a:t>1</a:t>
+            </a:r>
+            <a:r>
+              <a:rPr lang="en-US" b="0" dirty="0">
+                <a:solidFill>
+                  <a:srgbClr val="0000FF"/>
+                </a:solidFill>
+                <a:effectLst/>
+                <a:latin typeface="Consolas" panose="020B0609020204030204" pitchFamily="49" charset="0"/>
+              </a:rPr>
+              <a:t>} </a:t>
+            </a:r>
+            <a:r>
+              <a:rPr lang="en-US" b="0" dirty="0">
+                <a:solidFill>
+                  <a:srgbClr val="E50000"/>
+                </a:solidFill>
+                <a:effectLst/>
+                <a:latin typeface="Consolas" panose="020B0609020204030204" pitchFamily="49" charset="0"/>
+              </a:rPr>
               <a:t>name</a:t>
             </a:r>
             <a:r>
@@ -28882,6 +29106,14 @@
                 <a:latin typeface="Consolas" panose="020B0609020204030204" pitchFamily="49" charset="0"/>
               </a:rPr>
               <a:t> </a:t>
+            </a:r>
+          </a:p>
+          <a:p>
+            <a:r>
+              <a:rPr lang="en-US" dirty="0">
+                <a:latin typeface="Consolas" panose="020B0609020204030204" pitchFamily="49" charset="0"/>
+              </a:rPr>
+              <a:t>                  </a:t>
             </a:r>
             <a:r>
               <a:rPr lang="en-US" b="0" dirty="0" err="1">
@@ -29060,6 +29292,55 @@
                 <a:effectLst/>
                 <a:latin typeface="Consolas" panose="020B0609020204030204" pitchFamily="49" charset="0"/>
               </a:rPr>
+              <a:t>key</a:t>
+            </a:r>
+            <a:r>
+              <a:rPr lang="en-US" b="0" dirty="0">
+                <a:solidFill>
+                  <a:srgbClr val="000000"/>
+                </a:solidFill>
+                <a:effectLst/>
+                <a:latin typeface="Consolas" panose="020B0609020204030204" pitchFamily="49" charset="0"/>
+              </a:rPr>
+              <a:t>=</a:t>
+            </a:r>
+            <a:r>
+              <a:rPr lang="en-US" b="0" dirty="0">
+                <a:solidFill>
+                  <a:srgbClr val="0000FF"/>
+                </a:solidFill>
+                <a:effectLst/>
+                <a:latin typeface="Consolas" panose="020B0609020204030204" pitchFamily="49" charset="0"/>
+              </a:rPr>
+              <a:t>{</a:t>
+            </a:r>
+            <a:r>
+              <a:rPr lang="en-US" dirty="0">
+                <a:solidFill>
+                  <a:srgbClr val="098658"/>
+                </a:solidFill>
+                <a:latin typeface="Consolas" panose="020B0609020204030204" pitchFamily="49" charset="0"/>
+              </a:rPr>
+              <a:t>2</a:t>
+            </a:r>
+            <a:r>
+              <a:rPr lang="en-US" b="0" dirty="0">
+                <a:solidFill>
+                  <a:srgbClr val="0000FF"/>
+                </a:solidFill>
+                <a:effectLst/>
+                <a:latin typeface="Consolas" panose="020B0609020204030204" pitchFamily="49" charset="0"/>
+              </a:rPr>
+              <a:t>} </a:t>
+            </a:r>
+            <a:r>
+              <a:rPr lang="en-US" b="0" dirty="0">
+                <a:solidFill>
+                  <a:srgbClr val="E50000"/>
+                </a:solidFill>
+                <a:effectLst/>
+                <a:latin typeface="Consolas" panose="020B0609020204030204" pitchFamily="49" charset="0"/>
+              </a:rPr>
               <a:t>name</a:t>
             </a:r>
             <a:r>
@@ -29102,15 +29383,16 @@
               </a:rPr>
               <a:t>}</a:t>
             </a:r>
-            <a:r>
-              <a:rPr lang="en-US" b="0" dirty="0">
-                <a:solidFill>
-                  <a:srgbClr val="000000"/>
-                </a:solidFill>
-                <a:effectLst/>
-                <a:latin typeface="Consolas" panose="020B0609020204030204" pitchFamily="49" charset="0"/>
-              </a:rPr>
-              <a:t> </a:t>
+          </a:p>
+          <a:p>
+            <a:r>
+              <a:rPr lang="en-US" dirty="0">
+                <a:solidFill>
+                  <a:srgbClr val="0000FF"/>
+                </a:solidFill>
+                <a:latin typeface="Consolas" panose="020B0609020204030204" pitchFamily="49" charset="0"/>
+              </a:rPr>
+              <a:t>                  </a:t>
             </a:r>
             <a:r>
               <a:rPr lang="en-US" b="0" dirty="0" err="1">
@@ -29299,6 +29581,55 @@
                 <a:effectLst/>
                 <a:latin typeface="Consolas" panose="020B0609020204030204" pitchFamily="49" charset="0"/>
               </a:rPr>
+              <a:t>key</a:t>
+            </a:r>
+            <a:r>
+              <a:rPr lang="en-US" b="0" dirty="0">
+                <a:solidFill>
+                  <a:srgbClr val="000000"/>
+                </a:solidFill>
+                <a:effectLst/>
+                <a:latin typeface="Consolas" panose="020B0609020204030204" pitchFamily="49" charset="0"/>
+              </a:rPr>
+              <a:t>=</a:t>
+            </a:r>
+            <a:r>
+              <a:rPr lang="en-US" b="0" dirty="0">
+                <a:solidFill>
+                  <a:srgbClr val="0000FF"/>
+                </a:solidFill>
+                <a:effectLst/>
+                <a:latin typeface="Consolas" panose="020B0609020204030204" pitchFamily="49" charset="0"/>
+              </a:rPr>
+              <a:t>{</a:t>
+            </a:r>
+            <a:r>
+              <a:rPr lang="en-US" dirty="0">
+                <a:solidFill>
+                  <a:srgbClr val="098658"/>
+                </a:solidFill>
+                <a:latin typeface="Consolas" panose="020B0609020204030204" pitchFamily="49" charset="0"/>
+              </a:rPr>
+              <a:t>3</a:t>
+            </a:r>
+            <a:r>
+              <a:rPr lang="en-US" b="0" dirty="0">
+                <a:solidFill>
+                  <a:srgbClr val="0000FF"/>
+                </a:solidFill>
+                <a:effectLst/>
+                <a:latin typeface="Consolas" panose="020B0609020204030204" pitchFamily="49" charset="0"/>
+              </a:rPr>
+              <a:t>} </a:t>
+            </a:r>
+            <a:r>
+              <a:rPr lang="en-US" b="0" dirty="0">
+                <a:solidFill>
+                  <a:srgbClr val="E50000"/>
+                </a:solidFill>
+                <a:effectLst/>
+                <a:latin typeface="Consolas" panose="020B0609020204030204" pitchFamily="49" charset="0"/>
+              </a:rPr>
               <a:t>name</a:t>
             </a:r>
             <a:r>
@@ -29350,6 +29681,14 @@
                 <a:latin typeface="Consolas" panose="020B0609020204030204" pitchFamily="49" charset="0"/>
               </a:rPr>
               <a:t> </a:t>
+            </a:r>
+          </a:p>
+          <a:p>
+            <a:r>
+              <a:rPr lang="en-US" dirty="0">
+                <a:latin typeface="Consolas" panose="020B0609020204030204" pitchFamily="49" charset="0"/>
+              </a:rPr>
+              <a:t>                  </a:t>
             </a:r>
             <a:r>
               <a:rPr lang="en-US" b="0" dirty="0" err="1">
@@ -29568,8 +29907,8 @@
         </p:nvSpPr>
         <p:spPr>
           <a:xfrm>
-            <a:off x="6629185" y="878979"/>
-            <a:ext cx="5176128" cy="601981"/>
+            <a:off x="5231757" y="878979"/>
+            <a:ext cx="6573556" cy="601981"/>
           </a:xfrm>
           <a:prstGeom prst="roundRect">
             <a:avLst/>
@@ -29608,12 +29947,20 @@
           <a:p>
             <a:pPr algn="ctr"/>
             <a:r>
+              <a:rPr lang="en-US" sz="2400" dirty="0" err="1">
+                <a:solidFill>
+                  <a:schemeClr val="tx1"/>
+                </a:solidFill>
+              </a:rPr>
+              <a:t>src</a:t>
+            </a:r>
+            <a:r>
               <a:rPr lang="en-US" sz="2400" dirty="0">
                 <a:solidFill>
                   <a:schemeClr val="tx1"/>
                 </a:solidFill>
               </a:rPr>
-              <a:t>app/Apps/</a:t>
+              <a:t>/app/Apps/</a:t>
             </a:r>
             <a:r>
               <a:rPr lang="en-US" sz="2400" dirty="0" err="1">
@@ -29714,7 +30061,7 @@
           <a:p>
             <a:r>
               <a:rPr lang="en-US" dirty="0"/>
-              <a:t>First, let’s look at the clock</a:t>
+              <a:t>Next, let’s look at the clock</a:t>
             </a:r>
           </a:p>
         </p:txBody>
@@ -30502,7 +30849,7 @@
                 <a:effectLst/>
                 <a:latin typeface="Consolas" panose="020B0609020204030204" pitchFamily="49" charset="0"/>
               </a:rPr>
-              <a:t>    </a:t>
+              <a:t>    public </a:t>
             </a:r>
             <a:r>
               <a:rPr lang="en-US" sz="1400" b="0" dirty="0">
@@ -31077,7 +31424,7 @@
         </p:nvSpPr>
         <p:spPr>
           <a:xfrm>
-            <a:off x="6807200" y="3510339"/>
+            <a:off x="7608656" y="3090615"/>
             <a:ext cx="3745144" cy="2462213"/>
           </a:xfrm>
           <a:prstGeom prst="rect">
@@ -31514,12 +31861,20 @@
           <a:p>
             <a:pPr algn="ctr"/>
             <a:r>
+              <a:rPr lang="en-US" sz="2400" dirty="0" err="1">
+                <a:solidFill>
+                  <a:schemeClr val="tx1"/>
+                </a:solidFill>
+              </a:rPr>
+              <a:t>src</a:t>
+            </a:r>
+            <a:r>
               <a:rPr lang="en-US" sz="2400" dirty="0">
                 <a:solidFill>
                   <a:schemeClr val="tx1"/>
                 </a:solidFill>
               </a:rPr>
-              <a:t>app/Classes/</a:t>
+              <a:t>/app/Classes/</a:t>
             </a:r>
             <a:r>
               <a:rPr lang="en-US" sz="2400" dirty="0" err="1">
@@ -32532,12 +32887,20 @@
           <a:p>
             <a:pPr algn="ctr"/>
             <a:r>
+              <a:rPr lang="en-US" sz="2400" dirty="0" err="1">
+                <a:solidFill>
+                  <a:schemeClr val="tx1"/>
+                </a:solidFill>
+              </a:rPr>
+              <a:t>src</a:t>
+            </a:r>
+            <a:r>
               <a:rPr lang="en-US" sz="2400" dirty="0">
                 <a:solidFill>
                   <a:schemeClr val="tx1"/>
                 </a:solidFill>
               </a:rPr>
-              <a:t>app/Classes/</a:t>
+              <a:t>/app/Classes/</a:t>
             </a:r>
             <a:r>
               <a:rPr lang="en-US" sz="2400" dirty="0" err="1">
@@ -34088,8 +34451,8 @@
         </p:nvSpPr>
         <p:spPr>
           <a:xfrm>
-            <a:off x="6704633" y="569170"/>
-            <a:ext cx="5176128" cy="601981"/>
+            <a:off x="5636871" y="194935"/>
+            <a:ext cx="6440660" cy="601981"/>
           </a:xfrm>
           <a:prstGeom prst="roundRect">
             <a:avLst/>
@@ -34128,12 +34491,20 @@
           <a:p>
             <a:pPr algn="ctr"/>
             <a:r>
+              <a:rPr lang="en-US" sz="2400" dirty="0" err="1">
+                <a:solidFill>
+                  <a:schemeClr val="tx1"/>
+                </a:solidFill>
+              </a:rPr>
+              <a:t>src</a:t>
+            </a:r>
+            <a:r>
               <a:rPr lang="en-US" sz="2400" dirty="0">
                 <a:solidFill>
                   <a:schemeClr val="tx1"/>
                 </a:solidFill>
               </a:rPr>
-              <a:t>app/Apps/</a:t>
+              <a:t>/app/Components/</a:t>
             </a:r>
             <a:r>
               <a:rPr lang="en-US" sz="2400" dirty="0" err="1">

</xml_diff>